<commit_message>
Began with implementation of shader manager class.
</commit_message>
<xml_diff>
--- a/ExtraBees/doc/proposal_english.pptx
+++ b/ExtraBees/doc/proposal_english.pptx
@@ -4872,8 +4872,8 @@
               <a:t>Andreas </a:t>
             </a:r>
             <a:r>
-              <a:rPr lang="en-GB" sz="1800" dirty="0" err="1" smtClean="0"/>
-              <a:t>Stavropolous</a:t>
+              <a:rPr lang="en-GB" sz="1800" dirty="0" smtClean="0"/>
+              <a:t>Stavropoulos</a:t>
             </a:r>
             <a:endParaRPr lang="en-GB" sz="1800" dirty="0" smtClean="0"/>
           </a:p>
@@ -5264,8 +5264,8 @@
               <a:t>Blur and reflection/ global </a:t>
             </a:r>
             <a:r>
-              <a:rPr lang="en-US" sz="2800" dirty="0" err="1" smtClean="0"/>
-              <a:t>illuminiation</a:t>
+              <a:rPr lang="en-US" sz="2800" dirty="0" smtClean="0"/>
+              <a:t>illumination</a:t>
             </a:r>
             <a:endParaRPr lang="en-US" sz="2800" dirty="0" smtClean="0"/>
           </a:p>
@@ -5284,8 +5284,15 @@
           <a:p>
             <a:r>
               <a:rPr lang="en-US" sz="2800" dirty="0" smtClean="0"/>
-              <a:t>Light refraction with transparent object (glass)</a:t>
-            </a:r>
+              <a:t>Light refraction with transparent object (glass</a:t>
+            </a:r>
+            <a:r>
+              <a:rPr lang="en-US" sz="2800" dirty="0" smtClean="0"/>
+              <a:t>)</a:t>
+            </a:r>
+          </a:p>
+          <a:p>
+            <a:endParaRPr lang="en-US" sz="2800" dirty="0" smtClean="0"/>
           </a:p>
           <a:p>
             <a:pPr marL="0" indent="0">

</xml_diff>